<commit_message>
make check correct word
</commit_message>
<xml_diff>
--- a/16. Бор.pptx
+++ b/16. Бор.pptx
@@ -3834,68 +3834,9 @@
                     <a:lumOff val="5000"/>
                   </a:schemeClr>
                 </a:solidFill>
-                <a:hlinkClick r:id="rId2"/>
-              </a:rPr>
-              <a:t>Задача</a:t>
-            </a:r>
-            <a:endParaRPr dirty="0">
-              <a:solidFill>
-                <a:schemeClr val="tx1">
-                  <a:lumMod val="95000"/>
-                  <a:lumOff val="5000"/>
-                </a:schemeClr>
-              </a:solidFill>
-            </a:endParaRPr>
-          </a:p>
-        </p:txBody>
-      </p:sp>
-      <p:sp>
-        <p:nvSpPr>
-          <p:cNvPr id="11" name="TextBox 10">
-            <a:hlinkClick r:id="rId2"/>
-            <a:extLst>
-              <a:ext uri="{FF2B5EF4-FFF2-40B4-BE49-F238E27FC236}">
-                <a16:creationId xmlns:a16="http://schemas.microsoft.com/office/drawing/2014/main" id="{046A49C2-31E6-C044-C15E-B232F07959B3}"/>
-              </a:ext>
-            </a:extLst>
-          </p:cNvPr>
-          <p:cNvSpPr txBox="1"/>
-          <p:nvPr/>
-        </p:nvSpPr>
-        <p:spPr>
-          <a:xfrm>
-            <a:off x="3653319" y="6993136"/>
-            <a:ext cx="1824116" cy="523220"/>
-          </a:xfrm>
-          <a:prstGeom prst="rect">
-            <a:avLst/>
-          </a:prstGeom>
-          <a:noFill/>
-        </p:spPr>
-        <p:txBody>
-          <a:bodyPr wrap="square">
-            <a:spAutoFit/>
-          </a:bodyPr>
-          <a:lstStyle/>
-          <a:p>
-            <a:pPr algn="l">
-              <a:defRPr sz="2800">
-                <a:solidFill>
-                  <a:srgbClr val="FFFFFF"/>
-                </a:solidFill>
-              </a:defRPr>
-            </a:pPr>
-            <a:r>
-              <a:rPr lang="ru-RU" dirty="0">
-                <a:solidFill>
-                  <a:schemeClr val="tx1">
-                    <a:lumMod val="95000"/>
-                    <a:lumOff val="5000"/>
-                  </a:schemeClr>
-                </a:solidFill>
                 <a:hlinkClick r:id="rId3"/>
               </a:rPr>
-              <a:t>Задача</a:t>
+              <a:t>Бор</a:t>
             </a:r>
             <a:endParaRPr dirty="0">
               <a:solidFill>

</xml_diff>